<commit_message>
Avances en la Presentación.
</commit_message>
<xml_diff>
--- a/EasySQL/EasySQL/Recursos/Manual y diapositivas/diapositivas/EasySQL.pptx
+++ b/EasySQL/EasySQL/Recursos/Manual y diapositivas/diapositivas/EasySQL.pptx
@@ -13,24 +13,28 @@
     <p:sldId id="258" r:id="rId6"/>
     <p:sldId id="259" r:id="rId7"/>
     <p:sldId id="260" r:id="rId8"/>
-    <p:sldId id="264" r:id="rId9"/>
-    <p:sldId id="265" r:id="rId10"/>
-    <p:sldId id="266" r:id="rId11"/>
-    <p:sldId id="267" r:id="rId12"/>
-    <p:sldId id="263" r:id="rId13"/>
-    <p:sldId id="261" r:id="rId14"/>
-    <p:sldId id="262" r:id="rId15"/>
+    <p:sldId id="268" r:id="rId9"/>
+    <p:sldId id="272" r:id="rId10"/>
+    <p:sldId id="265" r:id="rId11"/>
+    <p:sldId id="266" r:id="rId12"/>
+    <p:sldId id="267" r:id="rId13"/>
+    <p:sldId id="269" r:id="rId14"/>
+    <p:sldId id="263" r:id="rId15"/>
+    <p:sldId id="271" r:id="rId16"/>
+    <p:sldId id="270" r:id="rId17"/>
+    <p:sldId id="261" r:id="rId18"/>
+    <p:sldId id="262" r:id="rId19"/>
   </p:sldIdLst>
   <p:sldSz cx="9144000" cy="5143500"/>
   <p:notesSz cx="6858000" cy="9144000"/>
   <p:embeddedFontLst>
     <p:embeddedFont>
       <p:font typeface="Maven Pro" panose="00000500000000000000"/>
-      <p:regular r:id="rId19"/>
+      <p:regular r:id="rId23"/>
     </p:embeddedFont>
     <p:embeddedFont>
       <p:font typeface="Nunito" panose="00000500000000000000"/>
-      <p:regular r:id="rId20"/>
+      <p:regular r:id="rId24"/>
     </p:embeddedFont>
   </p:embeddedFontLst>
   <p:defaultTextStyle>
@@ -800,6 +804,202 @@
   <p:cSld>
     <p:spTree>
       <p:nvGrpSpPr>
+        <p:cNvPr id="285" name="Shape 285"/>
+        <p:cNvGrpSpPr/>
+        <p:nvPr/>
+      </p:nvGrpSpPr>
+      <p:grpSpPr>
+        <a:xfrm>
+          <a:off x="0" y="0"/>
+          <a:ext cx="0" cy="0"/>
+          <a:chOff x="0" y="0"/>
+          <a:chExt cx="0" cy="0"/>
+        </a:xfrm>
+      </p:grpSpPr>
+      <p:sp>
+        <p:nvSpPr>
+          <p:cNvPr id="286" name="Shape 286"/>
+          <p:cNvSpPr/>
+          <p:nvPr>
+            <p:ph type="sldImg" idx="2"/>
+          </p:nvPr>
+        </p:nvSpPr>
+        <p:spPr>
+          <a:xfrm>
+            <a:off x="381300" y="685800"/>
+            <a:ext cx="6096000" cy="3429000"/>
+          </a:xfrm>
+          <a:custGeom>
+            <a:avLst/>
+            <a:gdLst/>
+            <a:ahLst/>
+            <a:cxnLst/>
+            <a:pathLst>
+              <a:path w="120000" h="120000" extrusionOk="0">
+                <a:moveTo>
+                  <a:pt x="0" y="0"/>
+                </a:moveTo>
+                <a:lnTo>
+                  <a:pt x="120000" y="0"/>
+                </a:lnTo>
+                <a:lnTo>
+                  <a:pt x="120000" y="120000"/>
+                </a:lnTo>
+                <a:lnTo>
+                  <a:pt x="0" y="120000"/>
+                </a:lnTo>
+                <a:close/>
+              </a:path>
+            </a:pathLst>
+          </a:custGeom>
+        </p:spPr>
+      </p:sp>
+      <p:sp>
+        <p:nvSpPr>
+          <p:cNvPr id="287" name="Shape 287"/>
+          <p:cNvSpPr txBox="1"/>
+          <p:nvPr>
+            <p:ph type="body" idx="1"/>
+          </p:nvPr>
+        </p:nvSpPr>
+        <p:spPr>
+          <a:xfrm>
+            <a:off x="685800" y="4343400"/>
+            <a:ext cx="5486400" cy="4114800"/>
+          </a:xfrm>
+          <a:prstGeom prst="rect">
+            <a:avLst/>
+          </a:prstGeom>
+        </p:spPr>
+        <p:txBody>
+          <a:bodyPr spcFirstLastPara="1" wrap="square" lIns="91425" tIns="91425" rIns="91425" bIns="91425" anchor="t" anchorCtr="0">
+            <a:noAutofit/>
+          </a:bodyPr>
+          <a:lstStyle/>
+          <a:p>
+            <a:pPr marL="0" lvl="0" indent="0">
+              <a:spcBef>
+                <a:spcPts val="0"/>
+              </a:spcBef>
+              <a:spcAft>
+                <a:spcPts val="0"/>
+              </a:spcAft>
+              <a:buNone/>
+            </a:pPr>
+          </a:p>
+        </p:txBody>
+      </p:sp>
+    </p:spTree>
+  </p:cSld>
+  <p:clrMapOvr>
+    <a:masterClrMapping/>
+  </p:clrMapOvr>
+</p:notes>
+</file>
+
+<file path=ppt/notesSlides/notesSlide11.xml><?xml version="1.0" encoding="utf-8"?>
+<p:notes xmlns:a="http://schemas.openxmlformats.org/drawingml/2006/main" xmlns:r="http://schemas.openxmlformats.org/officeDocument/2006/relationships" xmlns:p="http://schemas.openxmlformats.org/presentationml/2006/main" showMasterPhAnim="0" showMasterSp="0">
+  <p:cSld>
+    <p:spTree>
+      <p:nvGrpSpPr>
+        <p:cNvPr id="285" name="Shape 285"/>
+        <p:cNvGrpSpPr/>
+        <p:nvPr/>
+      </p:nvGrpSpPr>
+      <p:grpSpPr>
+        <a:xfrm>
+          <a:off x="0" y="0"/>
+          <a:ext cx="0" cy="0"/>
+          <a:chOff x="0" y="0"/>
+          <a:chExt cx="0" cy="0"/>
+        </a:xfrm>
+      </p:grpSpPr>
+      <p:sp>
+        <p:nvSpPr>
+          <p:cNvPr id="286" name="Shape 286"/>
+          <p:cNvSpPr/>
+          <p:nvPr>
+            <p:ph type="sldImg" idx="2"/>
+          </p:nvPr>
+        </p:nvSpPr>
+        <p:spPr>
+          <a:xfrm>
+            <a:off x="381300" y="685800"/>
+            <a:ext cx="6096000" cy="3429000"/>
+          </a:xfrm>
+          <a:custGeom>
+            <a:avLst/>
+            <a:gdLst/>
+            <a:ahLst/>
+            <a:cxnLst/>
+            <a:pathLst>
+              <a:path w="120000" h="120000" extrusionOk="0">
+                <a:moveTo>
+                  <a:pt x="0" y="0"/>
+                </a:moveTo>
+                <a:lnTo>
+                  <a:pt x="120000" y="0"/>
+                </a:lnTo>
+                <a:lnTo>
+                  <a:pt x="120000" y="120000"/>
+                </a:lnTo>
+                <a:lnTo>
+                  <a:pt x="0" y="120000"/>
+                </a:lnTo>
+                <a:close/>
+              </a:path>
+            </a:pathLst>
+          </a:custGeom>
+        </p:spPr>
+      </p:sp>
+      <p:sp>
+        <p:nvSpPr>
+          <p:cNvPr id="287" name="Shape 287"/>
+          <p:cNvSpPr txBox="1"/>
+          <p:nvPr>
+            <p:ph type="body" idx="1"/>
+          </p:nvPr>
+        </p:nvSpPr>
+        <p:spPr>
+          <a:xfrm>
+            <a:off x="685800" y="4343400"/>
+            <a:ext cx="5486400" cy="4114800"/>
+          </a:xfrm>
+          <a:prstGeom prst="rect">
+            <a:avLst/>
+          </a:prstGeom>
+        </p:spPr>
+        <p:txBody>
+          <a:bodyPr spcFirstLastPara="1" wrap="square" lIns="91425" tIns="91425" rIns="91425" bIns="91425" anchor="t" anchorCtr="0">
+            <a:noAutofit/>
+          </a:bodyPr>
+          <a:lstStyle/>
+          <a:p>
+            <a:pPr marL="0" lvl="0" indent="0">
+              <a:spcBef>
+                <a:spcPts val="0"/>
+              </a:spcBef>
+              <a:spcAft>
+                <a:spcPts val="0"/>
+              </a:spcAft>
+              <a:buNone/>
+            </a:pPr>
+          </a:p>
+        </p:txBody>
+      </p:sp>
+    </p:spTree>
+  </p:cSld>
+  <p:clrMapOvr>
+    <a:masterClrMapping/>
+  </p:clrMapOvr>
+</p:notes>
+</file>
+
+<file path=ppt/notesSlides/notesSlide12.xml><?xml version="1.0" encoding="utf-8"?>
+<p:notes xmlns:a="http://schemas.openxmlformats.org/drawingml/2006/main" xmlns:r="http://schemas.openxmlformats.org/officeDocument/2006/relationships" xmlns:p="http://schemas.openxmlformats.org/presentationml/2006/main" showMasterPhAnim="0" showMasterSp="0">
+  <p:cSld>
+    <p:spTree>
+      <p:nvGrpSpPr>
         <p:cNvPr id="291" name="Shape 291"/>
         <p:cNvGrpSpPr/>
         <p:nvPr/>
@@ -893,7 +1093,203 @@
 </p:notes>
 </file>
 
-<file path=ppt/notesSlides/notesSlide11.xml><?xml version="1.0" encoding="utf-8"?>
+<file path=ppt/notesSlides/notesSlide13.xml><?xml version="1.0" encoding="utf-8"?>
+<p:notes xmlns:a="http://schemas.openxmlformats.org/drawingml/2006/main" xmlns:r="http://schemas.openxmlformats.org/officeDocument/2006/relationships" xmlns:p="http://schemas.openxmlformats.org/presentationml/2006/main" showMasterPhAnim="0" showMasterSp="0">
+  <p:cSld>
+    <p:spTree>
+      <p:nvGrpSpPr>
+        <p:cNvPr id="291" name="Shape 291"/>
+        <p:cNvGrpSpPr/>
+        <p:nvPr/>
+      </p:nvGrpSpPr>
+      <p:grpSpPr>
+        <a:xfrm>
+          <a:off x="0" y="0"/>
+          <a:ext cx="0" cy="0"/>
+          <a:chOff x="0" y="0"/>
+          <a:chExt cx="0" cy="0"/>
+        </a:xfrm>
+      </p:grpSpPr>
+      <p:sp>
+        <p:nvSpPr>
+          <p:cNvPr id="292" name="Shape 292"/>
+          <p:cNvSpPr/>
+          <p:nvPr>
+            <p:ph type="sldImg" idx="2"/>
+          </p:nvPr>
+        </p:nvSpPr>
+        <p:spPr>
+          <a:xfrm>
+            <a:off x="381300" y="685800"/>
+            <a:ext cx="6096000" cy="3429000"/>
+          </a:xfrm>
+          <a:custGeom>
+            <a:avLst/>
+            <a:gdLst/>
+            <a:ahLst/>
+            <a:cxnLst/>
+            <a:pathLst>
+              <a:path w="120000" h="120000" extrusionOk="0">
+                <a:moveTo>
+                  <a:pt x="0" y="0"/>
+                </a:moveTo>
+                <a:lnTo>
+                  <a:pt x="120000" y="0"/>
+                </a:lnTo>
+                <a:lnTo>
+                  <a:pt x="120000" y="120000"/>
+                </a:lnTo>
+                <a:lnTo>
+                  <a:pt x="0" y="120000"/>
+                </a:lnTo>
+                <a:close/>
+              </a:path>
+            </a:pathLst>
+          </a:custGeom>
+        </p:spPr>
+      </p:sp>
+      <p:sp>
+        <p:nvSpPr>
+          <p:cNvPr id="293" name="Shape 293"/>
+          <p:cNvSpPr txBox="1"/>
+          <p:nvPr>
+            <p:ph type="body" idx="1"/>
+          </p:nvPr>
+        </p:nvSpPr>
+        <p:spPr>
+          <a:xfrm>
+            <a:off x="685800" y="4343400"/>
+            <a:ext cx="5486400" cy="4114800"/>
+          </a:xfrm>
+          <a:prstGeom prst="rect">
+            <a:avLst/>
+          </a:prstGeom>
+        </p:spPr>
+        <p:txBody>
+          <a:bodyPr spcFirstLastPara="1" wrap="square" lIns="91425" tIns="91425" rIns="91425" bIns="91425" anchor="t" anchorCtr="0">
+            <a:noAutofit/>
+          </a:bodyPr>
+          <a:lstStyle/>
+          <a:p>
+            <a:pPr marL="0" lvl="0" indent="0">
+              <a:spcBef>
+                <a:spcPts val="0"/>
+              </a:spcBef>
+              <a:spcAft>
+                <a:spcPts val="0"/>
+              </a:spcAft>
+              <a:buNone/>
+            </a:pPr>
+          </a:p>
+        </p:txBody>
+      </p:sp>
+    </p:spTree>
+  </p:cSld>
+  <p:clrMapOvr>
+    <a:masterClrMapping/>
+  </p:clrMapOvr>
+</p:notes>
+</file>
+
+<file path=ppt/notesSlides/notesSlide14.xml><?xml version="1.0" encoding="utf-8"?>
+<p:notes xmlns:a="http://schemas.openxmlformats.org/drawingml/2006/main" xmlns:r="http://schemas.openxmlformats.org/officeDocument/2006/relationships" xmlns:p="http://schemas.openxmlformats.org/presentationml/2006/main" showMasterPhAnim="0" showMasterSp="0">
+  <p:cSld>
+    <p:spTree>
+      <p:nvGrpSpPr>
+        <p:cNvPr id="291" name="Shape 291"/>
+        <p:cNvGrpSpPr/>
+        <p:nvPr/>
+      </p:nvGrpSpPr>
+      <p:grpSpPr>
+        <a:xfrm>
+          <a:off x="0" y="0"/>
+          <a:ext cx="0" cy="0"/>
+          <a:chOff x="0" y="0"/>
+          <a:chExt cx="0" cy="0"/>
+        </a:xfrm>
+      </p:grpSpPr>
+      <p:sp>
+        <p:nvSpPr>
+          <p:cNvPr id="292" name="Shape 292"/>
+          <p:cNvSpPr/>
+          <p:nvPr>
+            <p:ph type="sldImg" idx="2"/>
+          </p:nvPr>
+        </p:nvSpPr>
+        <p:spPr>
+          <a:xfrm>
+            <a:off x="381300" y="685800"/>
+            <a:ext cx="6096000" cy="3429000"/>
+          </a:xfrm>
+          <a:custGeom>
+            <a:avLst/>
+            <a:gdLst/>
+            <a:ahLst/>
+            <a:cxnLst/>
+            <a:pathLst>
+              <a:path w="120000" h="120000" extrusionOk="0">
+                <a:moveTo>
+                  <a:pt x="0" y="0"/>
+                </a:moveTo>
+                <a:lnTo>
+                  <a:pt x="120000" y="0"/>
+                </a:lnTo>
+                <a:lnTo>
+                  <a:pt x="120000" y="120000"/>
+                </a:lnTo>
+                <a:lnTo>
+                  <a:pt x="0" y="120000"/>
+                </a:lnTo>
+                <a:close/>
+              </a:path>
+            </a:pathLst>
+          </a:custGeom>
+        </p:spPr>
+      </p:sp>
+      <p:sp>
+        <p:nvSpPr>
+          <p:cNvPr id="293" name="Shape 293"/>
+          <p:cNvSpPr txBox="1"/>
+          <p:nvPr>
+            <p:ph type="body" idx="1"/>
+          </p:nvPr>
+        </p:nvSpPr>
+        <p:spPr>
+          <a:xfrm>
+            <a:off x="685800" y="4343400"/>
+            <a:ext cx="5486400" cy="4114800"/>
+          </a:xfrm>
+          <a:prstGeom prst="rect">
+            <a:avLst/>
+          </a:prstGeom>
+        </p:spPr>
+        <p:txBody>
+          <a:bodyPr spcFirstLastPara="1" wrap="square" lIns="91425" tIns="91425" rIns="91425" bIns="91425" anchor="t" anchorCtr="0">
+            <a:noAutofit/>
+          </a:bodyPr>
+          <a:lstStyle/>
+          <a:p>
+            <a:pPr marL="0" lvl="0" indent="0">
+              <a:spcBef>
+                <a:spcPts val="0"/>
+              </a:spcBef>
+              <a:spcAft>
+                <a:spcPts val="0"/>
+              </a:spcAft>
+              <a:buNone/>
+            </a:pPr>
+          </a:p>
+        </p:txBody>
+      </p:sp>
+    </p:spTree>
+  </p:cSld>
+  <p:clrMapOvr>
+    <a:masterClrMapping/>
+  </p:clrMapOvr>
+</p:notes>
+</file>
+
+<file path=ppt/notesSlides/notesSlide15.xml><?xml version="1.0" encoding="utf-8"?>
 <p:notes xmlns:a="http://schemas.openxmlformats.org/drawingml/2006/main" xmlns:r="http://schemas.openxmlformats.org/officeDocument/2006/relationships" xmlns:p="http://schemas.openxmlformats.org/presentationml/2006/main" showMasterPhAnim="0" showMasterSp="0">
   <p:cSld>
     <p:spTree>
@@ -991,7 +1387,7 @@
 </p:notes>
 </file>
 
-<file path=ppt/notesSlides/notesSlide12.xml><?xml version="1.0" encoding="utf-8"?>
+<file path=ppt/notesSlides/notesSlide16.xml><?xml version="1.0" encoding="utf-8"?>
 <p:notes xmlns:a="http://schemas.openxmlformats.org/drawingml/2006/main" xmlns:r="http://schemas.openxmlformats.org/officeDocument/2006/relationships" xmlns:p="http://schemas.openxmlformats.org/presentationml/2006/main" showMasterPhAnim="0" showMasterSp="0">
   <p:cSld>
     <p:spTree>
@@ -1584,6 +1980,104 @@
   <p:cSld>
     <p:spTree>
       <p:nvGrpSpPr>
+        <p:cNvPr id="296" name="Shape 296"/>
+        <p:cNvGrpSpPr/>
+        <p:nvPr/>
+      </p:nvGrpSpPr>
+      <p:grpSpPr>
+        <a:xfrm>
+          <a:off x="0" y="0"/>
+          <a:ext cx="0" cy="0"/>
+          <a:chOff x="0" y="0"/>
+          <a:chExt cx="0" cy="0"/>
+        </a:xfrm>
+      </p:grpSpPr>
+      <p:sp>
+        <p:nvSpPr>
+          <p:cNvPr id="297" name="Shape 297"/>
+          <p:cNvSpPr/>
+          <p:nvPr>
+            <p:ph type="sldImg" idx="2"/>
+          </p:nvPr>
+        </p:nvSpPr>
+        <p:spPr>
+          <a:xfrm>
+            <a:off x="381300" y="685800"/>
+            <a:ext cx="6096000" cy="3429000"/>
+          </a:xfrm>
+          <a:custGeom>
+            <a:avLst/>
+            <a:gdLst/>
+            <a:ahLst/>
+            <a:cxnLst/>
+            <a:pathLst>
+              <a:path w="120000" h="120000" extrusionOk="0">
+                <a:moveTo>
+                  <a:pt x="0" y="0"/>
+                </a:moveTo>
+                <a:lnTo>
+                  <a:pt x="120000" y="0"/>
+                </a:lnTo>
+                <a:lnTo>
+                  <a:pt x="120000" y="120000"/>
+                </a:lnTo>
+                <a:lnTo>
+                  <a:pt x="0" y="120000"/>
+                </a:lnTo>
+                <a:close/>
+              </a:path>
+            </a:pathLst>
+          </a:custGeom>
+        </p:spPr>
+      </p:sp>
+      <p:sp>
+        <p:nvSpPr>
+          <p:cNvPr id="298" name="Shape 298"/>
+          <p:cNvSpPr txBox="1"/>
+          <p:nvPr>
+            <p:ph type="body" idx="1"/>
+          </p:nvPr>
+        </p:nvSpPr>
+        <p:spPr>
+          <a:xfrm>
+            <a:off x="685800" y="4343400"/>
+            <a:ext cx="5486400" cy="4114800"/>
+          </a:xfrm>
+          <a:prstGeom prst="rect">
+            <a:avLst/>
+          </a:prstGeom>
+        </p:spPr>
+        <p:txBody>
+          <a:bodyPr spcFirstLastPara="1" wrap="square" lIns="91425" tIns="91425" rIns="91425" bIns="91425" anchor="t" anchorCtr="0">
+            <a:noAutofit/>
+          </a:bodyPr>
+          <a:lstStyle/>
+          <a:p>
+            <a:pPr marL="0" lvl="0" indent="0">
+              <a:spcBef>
+                <a:spcPts val="0"/>
+              </a:spcBef>
+              <a:spcAft>
+                <a:spcPts val="0"/>
+              </a:spcAft>
+              <a:buNone/>
+            </a:pPr>
+          </a:p>
+        </p:txBody>
+      </p:sp>
+    </p:spTree>
+  </p:cSld>
+  <p:clrMapOvr>
+    <a:masterClrMapping/>
+  </p:clrMapOvr>
+</p:notes>
+</file>
+
+<file path=ppt/notesSlides/notesSlide8.xml><?xml version="1.0" encoding="utf-8"?>
+<p:notes xmlns:a="http://schemas.openxmlformats.org/drawingml/2006/main" xmlns:r="http://schemas.openxmlformats.org/officeDocument/2006/relationships" xmlns:p="http://schemas.openxmlformats.org/presentationml/2006/main" showMasterPhAnim="0" showMasterSp="0">
+  <p:cSld>
+    <p:spTree>
+      <p:nvGrpSpPr>
         <p:cNvPr id="285" name="Shape 285"/>
         <p:cNvGrpSpPr/>
         <p:nvPr/>
@@ -1677,7 +2171,7 @@
 </p:notes>
 </file>
 
-<file path=ppt/notesSlides/notesSlide8.xml><?xml version="1.0" encoding="utf-8"?>
+<file path=ppt/notesSlides/notesSlide9.xml><?xml version="1.0" encoding="utf-8"?>
 <p:notes xmlns:a="http://schemas.openxmlformats.org/drawingml/2006/main" xmlns:r="http://schemas.openxmlformats.org/officeDocument/2006/relationships" xmlns:p="http://schemas.openxmlformats.org/presentationml/2006/main" showMasterPhAnim="0" showMasterSp="0">
   <p:cSld>
     <p:spTree>
@@ -1735,104 +2229,6 @@
       <p:sp>
         <p:nvSpPr>
           <p:cNvPr id="275" name="Shape 275"/>
-          <p:cNvSpPr txBox="1"/>
-          <p:nvPr>
-            <p:ph type="body" idx="1"/>
-          </p:nvPr>
-        </p:nvSpPr>
-        <p:spPr>
-          <a:xfrm>
-            <a:off x="685800" y="4343400"/>
-            <a:ext cx="5486400" cy="4114800"/>
-          </a:xfrm>
-          <a:prstGeom prst="rect">
-            <a:avLst/>
-          </a:prstGeom>
-        </p:spPr>
-        <p:txBody>
-          <a:bodyPr spcFirstLastPara="1" wrap="square" lIns="91425" tIns="91425" rIns="91425" bIns="91425" anchor="t" anchorCtr="0">
-            <a:noAutofit/>
-          </a:bodyPr>
-          <a:lstStyle/>
-          <a:p>
-            <a:pPr marL="0" lvl="0" indent="0">
-              <a:spcBef>
-                <a:spcPts val="0"/>
-              </a:spcBef>
-              <a:spcAft>
-                <a:spcPts val="0"/>
-              </a:spcAft>
-              <a:buNone/>
-            </a:pPr>
-          </a:p>
-        </p:txBody>
-      </p:sp>
-    </p:spTree>
-  </p:cSld>
-  <p:clrMapOvr>
-    <a:masterClrMapping/>
-  </p:clrMapOvr>
-</p:notes>
-</file>
-
-<file path=ppt/notesSlides/notesSlide9.xml><?xml version="1.0" encoding="utf-8"?>
-<p:notes xmlns:a="http://schemas.openxmlformats.org/drawingml/2006/main" xmlns:r="http://schemas.openxmlformats.org/officeDocument/2006/relationships" xmlns:p="http://schemas.openxmlformats.org/presentationml/2006/main" showMasterPhAnim="0" showMasterSp="0">
-  <p:cSld>
-    <p:spTree>
-      <p:nvGrpSpPr>
-        <p:cNvPr id="285" name="Shape 285"/>
-        <p:cNvGrpSpPr/>
-        <p:nvPr/>
-      </p:nvGrpSpPr>
-      <p:grpSpPr>
-        <a:xfrm>
-          <a:off x="0" y="0"/>
-          <a:ext cx="0" cy="0"/>
-          <a:chOff x="0" y="0"/>
-          <a:chExt cx="0" cy="0"/>
-        </a:xfrm>
-      </p:grpSpPr>
-      <p:sp>
-        <p:nvSpPr>
-          <p:cNvPr id="286" name="Shape 286"/>
-          <p:cNvSpPr/>
-          <p:nvPr>
-            <p:ph type="sldImg" idx="2"/>
-          </p:nvPr>
-        </p:nvSpPr>
-        <p:spPr>
-          <a:xfrm>
-            <a:off x="381300" y="685800"/>
-            <a:ext cx="6096000" cy="3429000"/>
-          </a:xfrm>
-          <a:custGeom>
-            <a:avLst/>
-            <a:gdLst/>
-            <a:ahLst/>
-            <a:cxnLst/>
-            <a:pathLst>
-              <a:path w="120000" h="120000" extrusionOk="0">
-                <a:moveTo>
-                  <a:pt x="0" y="0"/>
-                </a:moveTo>
-                <a:lnTo>
-                  <a:pt x="120000" y="0"/>
-                </a:lnTo>
-                <a:lnTo>
-                  <a:pt x="120000" y="120000"/>
-                </a:lnTo>
-                <a:lnTo>
-                  <a:pt x="0" y="120000"/>
-                </a:lnTo>
-                <a:close/>
-              </a:path>
-            </a:pathLst>
-          </a:custGeom>
-        </p:spPr>
-      </p:sp>
-      <p:sp>
-        <p:nvSpPr>
-          <p:cNvPr id="287" name="Shape 287"/>
           <p:cNvSpPr txBox="1"/>
           <p:nvPr>
             <p:ph type="body" idx="1"/>
@@ -15440,8 +15836,8 @@
         </p:nvSpPr>
         <p:spPr>
           <a:xfrm>
-            <a:off x="824000" y="1613813"/>
-            <a:ext cx="4255500" cy="1872900"/>
+            <a:off x="824230" y="1613535"/>
+            <a:ext cx="4746625" cy="1872615"/>
           </a:xfrm>
           <a:prstGeom prst="rect">
             <a:avLst/>
@@ -15463,10 +15859,10 @@
               <a:buNone/>
             </a:pPr>
             <a:r>
-              <a:rPr lang="en-US"/>
+              <a:rPr lang="en-US" sz="8000"/>
               <a:t>EasySQL</a:t>
             </a:r>
-            <a:endParaRPr lang="en-US"/>
+            <a:endParaRPr lang="en-US" sz="8000"/>
           </a:p>
         </p:txBody>
       </p:sp>
@@ -15503,10 +15899,10 @@
               <a:buNone/>
             </a:pPr>
             <a:r>
-              <a:rPr lang="en-US"/>
+              <a:rPr lang="en-US" sz="2000"/>
               <a:t>Interfaz gráfica SQL de fácil manejo.</a:t>
             </a:r>
-            <a:endParaRPr lang="en-US"/>
+            <a:endParaRPr lang="en-US" sz="2000"/>
           </a:p>
         </p:txBody>
       </p:sp>
@@ -15519,6 +15915,348 @@
 </file>
 
 <file path=ppt/slides/slide10.xml><?xml version="1.0" encoding="utf-8"?>
+<p:sld xmlns:a="http://schemas.openxmlformats.org/drawingml/2006/main" xmlns:r="http://schemas.openxmlformats.org/officeDocument/2006/relationships" xmlns:p="http://schemas.openxmlformats.org/presentationml/2006/main">
+  <p:cSld>
+    <p:spTree>
+      <p:nvGrpSpPr>
+        <p:cNvPr id="288" name="Shape 288"/>
+        <p:cNvGrpSpPr/>
+        <p:nvPr/>
+      </p:nvGrpSpPr>
+      <p:grpSpPr>
+        <a:xfrm>
+          <a:off x="0" y="0"/>
+          <a:ext cx="0" cy="0"/>
+          <a:chOff x="0" y="0"/>
+          <a:chExt cx="0" cy="0"/>
+        </a:xfrm>
+      </p:grpSpPr>
+      <p:pic>
+        <p:nvPicPr>
+          <p:cNvPr id="1" name="Imagen 0" descr="5VisualStudio"/>
+          <p:cNvPicPr>
+            <a:picLocks noChangeAspect="1"/>
+          </p:cNvPicPr>
+          <p:nvPr/>
+        </p:nvPicPr>
+        <p:blipFill>
+          <a:blip r:embed="rId1"/>
+          <a:stretch>
+            <a:fillRect/>
+          </a:stretch>
+        </p:blipFill>
+        <p:spPr>
+          <a:xfrm>
+            <a:off x="1893174" y="498475"/>
+            <a:ext cx="5357652" cy="900007"/>
+          </a:xfrm>
+          <a:prstGeom prst="rect">
+            <a:avLst/>
+          </a:prstGeom>
+          <a:effectLst>
+            <a:glow rad="127000">
+              <a:schemeClr val="bg1"/>
+            </a:glow>
+          </a:effectLst>
+        </p:spPr>
+      </p:pic>
+      <p:pic>
+        <p:nvPicPr>
+          <p:cNvPr id="3" name="Imagen 2" descr="6"/>
+          <p:cNvPicPr>
+            <a:picLocks noChangeAspect="1"/>
+          </p:cNvPicPr>
+          <p:nvPr/>
+        </p:nvPicPr>
+        <p:blipFill>
+          <a:blip r:embed="rId2"/>
+          <a:stretch>
+            <a:fillRect/>
+          </a:stretch>
+        </p:blipFill>
+        <p:spPr>
+          <a:xfrm>
+            <a:off x="2437130" y="2983315"/>
+            <a:ext cx="1440011" cy="1440011"/>
+          </a:xfrm>
+          <a:prstGeom prst="rect">
+            <a:avLst/>
+          </a:prstGeom>
+          <a:effectLst>
+            <a:glow rad="101600">
+              <a:schemeClr val="bg1"/>
+            </a:glow>
+          </a:effectLst>
+        </p:spPr>
+      </p:pic>
+      <p:pic>
+        <p:nvPicPr>
+          <p:cNvPr id="4" name="Imagen 3" descr="7mysqlworkbench"/>
+          <p:cNvPicPr>
+            <a:picLocks noChangeAspect="1"/>
+          </p:cNvPicPr>
+          <p:nvPr/>
+        </p:nvPicPr>
+        <p:blipFill>
+          <a:blip r:embed="rId3"/>
+          <a:stretch>
+            <a:fillRect/>
+          </a:stretch>
+        </p:blipFill>
+        <p:spPr>
+          <a:xfrm>
+            <a:off x="5154295" y="2983315"/>
+            <a:ext cx="1440011" cy="1440011"/>
+          </a:xfrm>
+          <a:prstGeom prst="rect">
+            <a:avLst/>
+          </a:prstGeom>
+          <a:effectLst>
+            <a:glow rad="127000">
+              <a:schemeClr val="bg1"/>
+            </a:glow>
+          </a:effectLst>
+        </p:spPr>
+      </p:pic>
+      <p:pic>
+        <p:nvPicPr>
+          <p:cNvPr id="9" name="Imagen 8" descr="8gitgithub"/>
+          <p:cNvPicPr>
+            <a:picLocks noChangeAspect="1"/>
+          </p:cNvPicPr>
+          <p:nvPr/>
+        </p:nvPicPr>
+        <p:blipFill>
+          <a:blip r:embed="rId4"/>
+          <a:stretch>
+            <a:fillRect/>
+          </a:stretch>
+        </p:blipFill>
+        <p:spPr>
+          <a:xfrm>
+            <a:off x="2052320" y="1740535"/>
+            <a:ext cx="5039360" cy="1028700"/>
+          </a:xfrm>
+          <a:prstGeom prst="rect">
+            <a:avLst/>
+          </a:prstGeom>
+          <a:effectLst>
+            <a:glow rad="127000">
+              <a:schemeClr val="bg1"/>
+            </a:glow>
+          </a:effectLst>
+        </p:spPr>
+      </p:pic>
+    </p:spTree>
+  </p:cSld>
+  <p:clrMapOvr>
+    <a:masterClrMapping/>
+  </p:clrMapOvr>
+</p:sld>
+</file>
+
+<file path=ppt/slides/slide11.xml><?xml version="1.0" encoding="utf-8"?>
+<p:sld xmlns:a="http://schemas.openxmlformats.org/drawingml/2006/main" xmlns:r="http://schemas.openxmlformats.org/officeDocument/2006/relationships" xmlns:p="http://schemas.openxmlformats.org/presentationml/2006/main">
+  <p:cSld>
+    <p:spTree>
+      <p:nvGrpSpPr>
+        <p:cNvPr id="288" name="Shape 288"/>
+        <p:cNvGrpSpPr/>
+        <p:nvPr/>
+      </p:nvGrpSpPr>
+      <p:grpSpPr>
+        <a:xfrm>
+          <a:off x="0" y="0"/>
+          <a:ext cx="0" cy="0"/>
+          <a:chOff x="0" y="0"/>
+          <a:chExt cx="0" cy="0"/>
+        </a:xfrm>
+      </p:grpSpPr>
+      <p:pic>
+        <p:nvPicPr>
+          <p:cNvPr id="2" name="Imagen 1" descr="8sql"/>
+          <p:cNvPicPr>
+            <a:picLocks noChangeAspect="1"/>
+          </p:cNvPicPr>
+          <p:nvPr/>
+        </p:nvPicPr>
+        <p:blipFill>
+          <a:blip r:embed="rId1"/>
+          <a:stretch>
+            <a:fillRect/>
+          </a:stretch>
+        </p:blipFill>
+        <p:spPr>
+          <a:xfrm>
+            <a:off x="985520" y="2834005"/>
+            <a:ext cx="4676140" cy="1784985"/>
+          </a:xfrm>
+          <a:prstGeom prst="rect">
+            <a:avLst/>
+          </a:prstGeom>
+          <a:effectLst>
+            <a:glow rad="533400">
+              <a:schemeClr val="bg1"/>
+            </a:glow>
+            <a:reflection endPos="53000" dir="5400000" sy="-100000" algn="bl" rotWithShape="0"/>
+          </a:effectLst>
+        </p:spPr>
+      </p:pic>
+      <p:pic>
+        <p:nvPicPr>
+          <p:cNvPr id="5" name="Imagen 4" descr="8wpf"/>
+          <p:cNvPicPr>
+            <a:picLocks noChangeAspect="1"/>
+          </p:cNvPicPr>
+          <p:nvPr/>
+        </p:nvPicPr>
+        <p:blipFill>
+          <a:blip r:embed="rId2"/>
+          <a:srcRect/>
+          <a:stretch>
+            <a:fillRect/>
+          </a:stretch>
+        </p:blipFill>
+        <p:spPr>
+          <a:xfrm>
+            <a:off x="985520" y="399415"/>
+            <a:ext cx="3100501" cy="2160016"/>
+          </a:xfrm>
+          <a:prstGeom prst="rect">
+            <a:avLst/>
+          </a:prstGeom>
+          <a:effectLst>
+            <a:glow rad="304800">
+              <a:schemeClr val="bg1"/>
+            </a:glow>
+            <a:reflection stA="45000" endPos="0" dist="50800" dir="5400000" sy="-100000" algn="bl" rotWithShape="0"/>
+          </a:effectLst>
+        </p:spPr>
+      </p:pic>
+      <p:pic>
+        <p:nvPicPr>
+          <p:cNvPr id="6" name="Imagen 5" descr="10csharp"/>
+          <p:cNvPicPr>
+            <a:picLocks noChangeAspect="1"/>
+          </p:cNvPicPr>
+          <p:nvPr/>
+        </p:nvPicPr>
+        <p:blipFill>
+          <a:blip r:embed="rId3"/>
+          <a:stretch>
+            <a:fillRect/>
+          </a:stretch>
+        </p:blipFill>
+        <p:spPr>
+          <a:xfrm>
+            <a:off x="5848350" y="399415"/>
+            <a:ext cx="2160016" cy="2160016"/>
+          </a:xfrm>
+          <a:prstGeom prst="rect">
+            <a:avLst/>
+          </a:prstGeom>
+          <a:effectLst>
+            <a:glow rad="508000">
+              <a:schemeClr val="bg1"/>
+            </a:glow>
+          </a:effectLst>
+        </p:spPr>
+      </p:pic>
+      <p:pic>
+        <p:nvPicPr>
+          <p:cNvPr id="7" name="Imagen 6" descr="bcrypt-logo"/>
+          <p:cNvPicPr>
+            <a:picLocks noChangeAspect="1"/>
+          </p:cNvPicPr>
+          <p:nvPr/>
+        </p:nvPicPr>
+        <p:blipFill>
+          <a:blip r:embed="rId4"/>
+          <a:stretch>
+            <a:fillRect/>
+          </a:stretch>
+        </p:blipFill>
+        <p:spPr>
+          <a:xfrm>
+            <a:off x="6028690" y="2834005"/>
+            <a:ext cx="1800013" cy="1800013"/>
+          </a:xfrm>
+          <a:prstGeom prst="rect">
+            <a:avLst/>
+          </a:prstGeom>
+          <a:effectLst>
+            <a:glow rad="635000">
+              <a:schemeClr val="bg1"/>
+            </a:glow>
+            <a:reflection blurRad="101600" endPos="52000" dir="5400000" sy="-100000" algn="bl" rotWithShape="0"/>
+          </a:effectLst>
+        </p:spPr>
+      </p:pic>
+    </p:spTree>
+  </p:cSld>
+  <p:clrMapOvr>
+    <a:masterClrMapping/>
+  </p:clrMapOvr>
+</p:sld>
+</file>
+
+<file path=ppt/slides/slide12.xml><?xml version="1.0" encoding="utf-8"?>
+<p:sld xmlns:a="http://schemas.openxmlformats.org/drawingml/2006/main" xmlns:r="http://schemas.openxmlformats.org/officeDocument/2006/relationships" xmlns:p="http://schemas.openxmlformats.org/presentationml/2006/main">
+  <p:cSld>
+    <p:spTree>
+      <p:nvGrpSpPr>
+        <p:cNvPr id="294" name="Shape 294"/>
+        <p:cNvGrpSpPr/>
+        <p:nvPr/>
+      </p:nvGrpSpPr>
+      <p:grpSpPr>
+        <a:xfrm>
+          <a:off x="0" y="0"/>
+          <a:ext cx="0" cy="0"/>
+          <a:chOff x="0" y="0"/>
+          <a:chExt cx="0" cy="0"/>
+        </a:xfrm>
+      </p:grpSpPr>
+      <p:pic>
+        <p:nvPicPr>
+          <p:cNvPr id="2" name="Imagen 1" descr="4operaciones"/>
+          <p:cNvPicPr>
+            <a:picLocks noChangeAspect="1"/>
+          </p:cNvPicPr>
+          <p:nvPr/>
+        </p:nvPicPr>
+        <p:blipFill>
+          <a:blip r:embed="rId1"/>
+          <a:stretch>
+            <a:fillRect/>
+          </a:stretch>
+        </p:blipFill>
+        <p:spPr>
+          <a:xfrm>
+            <a:off x="828040" y="461645"/>
+            <a:ext cx="7487920" cy="4220210"/>
+          </a:xfrm>
+          <a:prstGeom prst="rect">
+            <a:avLst/>
+          </a:prstGeom>
+          <a:effectLst>
+            <a:outerShdw blurRad="50800" dist="203200" dir="5400000" sx="104000" sy="104000" algn="t" rotWithShape="0">
+              <a:prstClr val="black">
+                <a:alpha val="40000"/>
+              </a:prstClr>
+            </a:outerShdw>
+          </a:effectLst>
+        </p:spPr>
+      </p:pic>
+    </p:spTree>
+  </p:cSld>
+  <p:clrMapOvr>
+    <a:masterClrMapping/>
+  </p:clrMapOvr>
+</p:sld>
+</file>
+
+<file path=ppt/slides/slide13.xml><?xml version="1.0" encoding="utf-8"?>
 <p:sld xmlns:a="http://schemas.openxmlformats.org/drawingml/2006/main" xmlns:r="http://schemas.openxmlformats.org/officeDocument/2006/relationships" xmlns:p="http://schemas.openxmlformats.org/presentationml/2006/main">
   <p:cSld>
     <p:spTree>
@@ -15570,6 +16308,38 @@
           </a:p>
         </p:txBody>
       </p:sp>
+      <p:pic>
+        <p:nvPicPr>
+          <p:cNvPr id="2" name="Imagen 1" descr="C:\Users\aario\source\repos\EasySQL\EasySQL\EasySQL\Recursos\Manual y diapositivas\img\pruebas\5connIntegrated2.PNG5connIntegrated2"/>
+          <p:cNvPicPr>
+            <a:picLocks noChangeAspect="1"/>
+          </p:cNvPicPr>
+          <p:nvPr/>
+        </p:nvPicPr>
+        <p:blipFill>
+          <a:blip r:embed="rId1"/>
+          <a:srcRect/>
+          <a:stretch>
+            <a:fillRect/>
+          </a:stretch>
+        </p:blipFill>
+        <p:spPr>
+          <a:xfrm>
+            <a:off x="828675" y="461645"/>
+            <a:ext cx="7486650" cy="4219575"/>
+          </a:xfrm>
+          <a:prstGeom prst="rect">
+            <a:avLst/>
+          </a:prstGeom>
+          <a:effectLst>
+            <a:outerShdw blurRad="50800" dist="203200" dir="5400000" sx="104000" sy="104000" algn="t" rotWithShape="0">
+              <a:prstClr val="black">
+                <a:alpha val="40000"/>
+              </a:prstClr>
+            </a:outerShdw>
+          </a:effectLst>
+        </p:spPr>
+      </p:pic>
     </p:spTree>
   </p:cSld>
   <p:clrMapOvr>
@@ -15578,7 +16348,67 @@
 </p:sld>
 </file>
 
-<file path=ppt/slides/slide11.xml><?xml version="1.0" encoding="utf-8"?>
+<file path=ppt/slides/slide14.xml><?xml version="1.0" encoding="utf-8"?>
+<p:sld xmlns:a="http://schemas.openxmlformats.org/drawingml/2006/main" xmlns:r="http://schemas.openxmlformats.org/officeDocument/2006/relationships" xmlns:p="http://schemas.openxmlformats.org/presentationml/2006/main">
+  <p:cSld>
+    <p:spTree>
+      <p:nvGrpSpPr>
+        <p:cNvPr id="294" name="Shape 294"/>
+        <p:cNvGrpSpPr/>
+        <p:nvPr/>
+      </p:nvGrpSpPr>
+      <p:grpSpPr>
+        <a:xfrm>
+          <a:off x="0" y="0"/>
+          <a:ext cx="0" cy="0"/>
+          <a:chOff x="0" y="0"/>
+          <a:chExt cx="0" cy="0"/>
+        </a:xfrm>
+      </p:grpSpPr>
+      <p:sp>
+        <p:nvSpPr>
+          <p:cNvPr id="295" name="Shape 295"/>
+          <p:cNvSpPr txBox="1"/>
+          <p:nvPr>
+            <p:ph type="title"/>
+          </p:nvPr>
+        </p:nvSpPr>
+        <p:spPr>
+          <a:xfrm>
+            <a:off x="824000" y="1613825"/>
+            <a:ext cx="5857800" cy="1872900"/>
+          </a:xfrm>
+          <a:prstGeom prst="rect">
+            <a:avLst/>
+          </a:prstGeom>
+        </p:spPr>
+        <p:txBody>
+          <a:bodyPr spcFirstLastPara="1" wrap="square" lIns="91425" tIns="91425" rIns="91425" bIns="91425" anchor="ctr" anchorCtr="0">
+            <a:noAutofit/>
+          </a:bodyPr>
+          <a:lstStyle/>
+          <a:p>
+            <a:pPr marL="0" lvl="0" indent="0">
+              <a:spcBef>
+                <a:spcPts val="0"/>
+              </a:spcBef>
+              <a:spcAft>
+                <a:spcPts val="0"/>
+              </a:spcAft>
+              <a:buNone/>
+            </a:pPr>
+          </a:p>
+        </p:txBody>
+      </p:sp>
+    </p:spTree>
+  </p:cSld>
+  <p:clrMapOvr>
+    <a:masterClrMapping/>
+  </p:clrMapOvr>
+</p:sld>
+</file>
+
+<file path=ppt/slides/slide15.xml><?xml version="1.0" encoding="utf-8"?>
 <p:sld xmlns:a="http://schemas.openxmlformats.org/drawingml/2006/main" xmlns:r="http://schemas.openxmlformats.org/officeDocument/2006/relationships" xmlns:p="http://schemas.openxmlformats.org/presentationml/2006/main">
   <p:cSld>
     <p:spTree>
@@ -15673,7 +16503,7 @@
 </p:sld>
 </file>
 
-<file path=ppt/slides/slide12.xml><?xml version="1.0" encoding="utf-8"?>
+<file path=ppt/slides/slide16.xml><?xml version="1.0" encoding="utf-8"?>
 <p:sld xmlns:a="http://schemas.openxmlformats.org/drawingml/2006/main" xmlns:r="http://schemas.openxmlformats.org/officeDocument/2006/relationships" xmlns:p="http://schemas.openxmlformats.org/presentationml/2006/main">
   <p:cSld>
     <p:spTree>
@@ -15857,41 +16687,6 @@
               <a:t>¿Cuánto tiempo necesitas hasta que empiezas a ver resultados?</a:t>
             </a:r>
             <a:endParaRPr sz="4800"/>
-          </a:p>
-        </p:txBody>
-      </p:sp>
-      <p:sp>
-        <p:nvSpPr>
-          <p:cNvPr id="284" name="Shape 284"/>
-          <p:cNvSpPr txBox="1"/>
-          <p:nvPr>
-            <p:ph type="body" idx="1"/>
-          </p:nvPr>
-        </p:nvSpPr>
-        <p:spPr>
-          <a:xfrm>
-            <a:off x="1477150" y="2889375"/>
-            <a:ext cx="6366900" cy="1111200"/>
-          </a:xfrm>
-          <a:prstGeom prst="rect">
-            <a:avLst/>
-          </a:prstGeom>
-        </p:spPr>
-        <p:txBody>
-          <a:bodyPr spcFirstLastPara="1" wrap="square" lIns="91425" tIns="91425" rIns="91425" bIns="91425" anchor="t" anchorCtr="0">
-            <a:noAutofit/>
-          </a:bodyPr>
-          <a:lstStyle/>
-          <a:p>
-            <a:pPr marL="0" lvl="0" indent="0">
-              <a:spcBef>
-                <a:spcPts val="0"/>
-              </a:spcBef>
-              <a:spcAft>
-                <a:spcPts val="1600"/>
-              </a:spcAft>
-              <a:buNone/>
-            </a:pPr>
           </a:p>
         </p:txBody>
       </p:sp>
@@ -16177,25 +16972,9 @@
           <a:chExt cx="0" cy="0"/>
         </a:xfrm>
       </p:grpSpPr>
-      <p:sp>
-        <p:nvSpPr>
-          <p:cNvPr id="2" name="Título 1"/>
-          <p:cNvSpPr/>
-          <p:nvPr>
-            <p:ph type="title"/>
-          </p:nvPr>
-        </p:nvSpPr>
-        <p:spPr/>
-        <p:txBody>
-          <a:bodyPr/>
-          <a:p>
-            <a:endParaRPr lang="es-ES" altLang="en-US"/>
-          </a:p>
-        </p:txBody>
-      </p:sp>
       <p:pic>
         <p:nvPicPr>
-          <p:cNvPr id="3" name="Imagen 2" descr="1MercadoActual"/>
+          <p:cNvPr id="1" name="Imagen 0" descr="2"/>
           <p:cNvPicPr>
             <a:picLocks noChangeAspect="1"/>
           </p:cNvPicPr>
@@ -16209,8 +16988,94 @@
         </p:blipFill>
         <p:spPr>
           <a:xfrm>
-            <a:off x="824230" y="1283970"/>
-            <a:ext cx="5989320" cy="3216910"/>
+            <a:off x="824230" y="679450"/>
+            <a:ext cx="6967855" cy="3742055"/>
+          </a:xfrm>
+          <a:prstGeom prst="rect">
+            <a:avLst/>
+          </a:prstGeom>
+          <a:effectLst>
+            <a:glow rad="254000">
+              <a:schemeClr val="bg1">
+                <a:alpha val="100000"/>
+              </a:schemeClr>
+            </a:glow>
+            <a:outerShdw blurRad="254000" dir="5400000" sx="101000" sy="101000" algn="ctr" rotWithShape="0">
+              <a:srgbClr val="000000">
+                <a:alpha val="100000"/>
+              </a:srgbClr>
+            </a:outerShdw>
+            <a:reflection stA="43000" endPos="30000" dist="50800" dir="5400000" sy="-100000" algn="bl" rotWithShape="0"/>
+          </a:effectLst>
+        </p:spPr>
+      </p:pic>
+    </p:spTree>
+  </p:cSld>
+  <p:clrMapOvr>
+    <a:masterClrMapping/>
+  </p:clrMapOvr>
+</p:sld>
+</file>
+
+<file path=ppt/slides/slide7.xml><?xml version="1.0" encoding="utf-8"?>
+<p:sld xmlns:a="http://schemas.openxmlformats.org/drawingml/2006/main" xmlns:r="http://schemas.openxmlformats.org/officeDocument/2006/relationships" xmlns:p="http://schemas.openxmlformats.org/presentationml/2006/main">
+  <p:cSld>
+    <p:spTree>
+      <p:nvGrpSpPr>
+        <p:cNvPr id="299" name="Shape 299"/>
+        <p:cNvGrpSpPr/>
+        <p:nvPr/>
+      </p:nvGrpSpPr>
+      <p:grpSpPr>
+        <a:xfrm>
+          <a:off x="0" y="0"/>
+          <a:ext cx="0" cy="0"/>
+          <a:chOff x="0" y="0"/>
+          <a:chExt cx="0" cy="0"/>
+        </a:xfrm>
+      </p:grpSpPr>
+      <p:pic>
+        <p:nvPicPr>
+          <p:cNvPr id="2" name="Imagen 1" descr="6"/>
+          <p:cNvPicPr>
+            <a:picLocks noChangeAspect="1"/>
+          </p:cNvPicPr>
+          <p:nvPr/>
+        </p:nvPicPr>
+        <p:blipFill>
+          <a:blip r:embed="rId1"/>
+          <a:stretch>
+            <a:fillRect/>
+          </a:stretch>
+        </p:blipFill>
+        <p:spPr>
+          <a:xfrm>
+            <a:off x="1367790" y="1311741"/>
+            <a:ext cx="2520019" cy="2520019"/>
+          </a:xfrm>
+          <a:prstGeom prst="rect">
+            <a:avLst/>
+          </a:prstGeom>
+        </p:spPr>
+      </p:pic>
+      <p:pic>
+        <p:nvPicPr>
+          <p:cNvPr id="3" name="Imagen 2" descr="7mysqlworkbench"/>
+          <p:cNvPicPr>
+            <a:picLocks noChangeAspect="1"/>
+          </p:cNvPicPr>
+          <p:nvPr/>
+        </p:nvPicPr>
+        <p:blipFill>
+          <a:blip r:embed="rId2"/>
+          <a:stretch>
+            <a:fillRect/>
+          </a:stretch>
+        </p:blipFill>
+        <p:spPr>
+          <a:xfrm>
+            <a:off x="5255260" y="1311741"/>
+            <a:ext cx="2520019" cy="2520019"/>
           </a:xfrm>
           <a:prstGeom prst="rect">
             <a:avLst/>
@@ -16225,7 +17090,7 @@
 </p:sld>
 </file>
 
-<file path=ppt/slides/slide7.xml><?xml version="1.0" encoding="utf-8"?>
+<file path=ppt/slides/slide8.xml><?xml version="1.0" encoding="utf-8"?>
 <p:sld xmlns:a="http://schemas.openxmlformats.org/drawingml/2006/main" xmlns:r="http://schemas.openxmlformats.org/officeDocument/2006/relationships" xmlns:p="http://schemas.openxmlformats.org/presentationml/2006/main">
   <p:cSld>
     <p:spTree>
@@ -16349,7 +17214,7 @@
 </p:sld>
 </file>
 
-<file path=ppt/slides/slide8.xml><?xml version="1.0" encoding="utf-8"?>
+<file path=ppt/slides/slide9.xml><?xml version="1.0" encoding="utf-8"?>
 <p:sld xmlns:a="http://schemas.openxmlformats.org/drawingml/2006/main" xmlns:r="http://schemas.openxmlformats.org/officeDocument/2006/relationships" xmlns:p="http://schemas.openxmlformats.org/presentationml/2006/main">
   <p:cSld>
     <p:spTree>
@@ -16406,7 +17271,7 @@
             </a:br>
             <a:r>
               <a:rPr lang="es-ES" altLang="en-US"/>
-              <a:t>- Mayormente gráfica</a:t>
+              <a:t>- Mayormente gráfico</a:t>
             </a:r>
             <a:br>
               <a:rPr lang="es-ES" altLang="en-US"/>
@@ -16440,130 +17305,6 @@
           </a:p>
         </p:txBody>
       </p:sp>
-    </p:spTree>
-  </p:cSld>
-  <p:clrMapOvr>
-    <a:masterClrMapping/>
-  </p:clrMapOvr>
-</p:sld>
-</file>
-
-<file path=ppt/slides/slide9.xml><?xml version="1.0" encoding="utf-8"?>
-<p:sld xmlns:a="http://schemas.openxmlformats.org/drawingml/2006/main" xmlns:r="http://schemas.openxmlformats.org/officeDocument/2006/relationships" xmlns:p="http://schemas.openxmlformats.org/presentationml/2006/main">
-  <p:cSld>
-    <p:spTree>
-      <p:nvGrpSpPr>
-        <p:cNvPr id="288" name="Shape 288"/>
-        <p:cNvGrpSpPr/>
-        <p:nvPr/>
-      </p:nvGrpSpPr>
-      <p:grpSpPr>
-        <a:xfrm>
-          <a:off x="0" y="0"/>
-          <a:ext cx="0" cy="0"/>
-          <a:chOff x="0" y="0"/>
-          <a:chExt cx="0" cy="0"/>
-        </a:xfrm>
-      </p:grpSpPr>
-      <p:pic>
-        <p:nvPicPr>
-          <p:cNvPr id="2" name="Imagen 1" descr="0EasySQL"/>
-          <p:cNvPicPr>
-            <a:picLocks noChangeAspect="1"/>
-          </p:cNvPicPr>
-          <p:nvPr/>
-        </p:nvPicPr>
-        <p:blipFill>
-          <a:blip r:embed="rId1"/>
-          <a:stretch>
-            <a:fillRect/>
-          </a:stretch>
-        </p:blipFill>
-        <p:spPr>
-          <a:xfrm>
-            <a:off x="2602865" y="748665"/>
-            <a:ext cx="3937635" cy="3048635"/>
-          </a:xfrm>
-          <a:prstGeom prst="rect">
-            <a:avLst/>
-          </a:prstGeom>
-          <a:effectLst>
-            <a:glow rad="228600">
-              <a:schemeClr val="bg1">
-                <a:alpha val="100000"/>
-              </a:schemeClr>
-            </a:glow>
-            <a:reflection blurRad="6350" stA="50000" endA="300" endPos="55000" dir="5400000" sy="-100000" algn="bl" rotWithShape="0"/>
-          </a:effectLst>
-          <a:scene3d>
-            <a:camera prst="orthographicFront"/>
-            <a:lightRig rig="threePt" dir="t"/>
-          </a:scene3d>
-          <a:sp3d/>
-        </p:spPr>
-      </p:pic>
-      <p:pic>
-        <p:nvPicPr>
-          <p:cNvPr id="6" name="Imagen 5" descr="mysql"/>
-          <p:cNvPicPr>
-            <a:picLocks noChangeAspect="1"/>
-          </p:cNvPicPr>
-          <p:nvPr/>
-        </p:nvPicPr>
-        <p:blipFill>
-          <a:blip r:embed="rId2"/>
-          <a:stretch>
-            <a:fillRect/>
-          </a:stretch>
-        </p:blipFill>
-        <p:spPr>
-          <a:xfrm>
-            <a:off x="714375" y="1472565"/>
-            <a:ext cx="2261235" cy="1600835"/>
-          </a:xfrm>
-          <a:prstGeom prst="rect">
-            <a:avLst/>
-          </a:prstGeom>
-          <a:effectLst>
-            <a:glow rad="254000">
-              <a:schemeClr val="bg1">
-                <a:alpha val="100000"/>
-              </a:schemeClr>
-            </a:glow>
-          </a:effectLst>
-        </p:spPr>
-      </p:pic>
-      <p:pic>
-        <p:nvPicPr>
-          <p:cNvPr id="7" name="Imagen 6" descr="sql server"/>
-          <p:cNvPicPr>
-            <a:picLocks noChangeAspect="1"/>
-          </p:cNvPicPr>
-          <p:nvPr/>
-        </p:nvPicPr>
-        <p:blipFill>
-          <a:blip r:embed="rId3"/>
-          <a:stretch>
-            <a:fillRect/>
-          </a:stretch>
-        </p:blipFill>
-        <p:spPr>
-          <a:xfrm>
-            <a:off x="5976620" y="1137285"/>
-            <a:ext cx="3110865" cy="2272030"/>
-          </a:xfrm>
-          <a:prstGeom prst="rect">
-            <a:avLst/>
-          </a:prstGeom>
-          <a:effectLst>
-            <a:glow rad="368300">
-              <a:schemeClr val="bg1">
-                <a:alpha val="100000"/>
-              </a:schemeClr>
-            </a:glow>
-          </a:effectLst>
-        </p:spPr>
-      </p:pic>
     </p:spTree>
   </p:cSld>
   <p:clrMapOvr>

</xml_diff>